<commit_message>
add lecture notes for pandas wk4.1
</commit_message>
<xml_diff>
--- a/Instructor Notes/PANDAS-WK4.1/PandasWk4.1.pptx
+++ b/Instructor Notes/PANDAS-WK4.1/PandasWk4.1.pptx
@@ -256,7 +256,7 @@
           <a:p>
             <a:fld id="{51A969EA-8566-418D-AC96-BC5F6E9FAB6C}" type="datetimeFigureOut">
               <a:rPr lang="en-US" smtClean="0"/>
-              <a:t>11/30/18</a:t>
+              <a:t>12/1/18</a:t>
             </a:fld>
             <a:endParaRPr lang="en-US"/>
           </a:p>
@@ -421,7 +421,7 @@
           <a:p>
             <a:fld id="{33B07B4B-74D8-4C42-A719-1F93879497F8}" type="datetimeFigureOut">
               <a:rPr lang="en-US" smtClean="0"/>
-              <a:t>11/30/18</a:t>
+              <a:t>12/1/18</a:t>
             </a:fld>
             <a:endParaRPr lang="en-US"/>
           </a:p>
@@ -2316,7 +2316,7 @@
           <a:p>
             <a:fld id="{B65C9255-9F07-4181-9AD2-897FFC0A3B7E}" type="datetimeFigureOut">
               <a:rPr lang="en-US" smtClean="0"/>
-              <a:t>11/30/18</a:t>
+              <a:t>12/1/18</a:t>
             </a:fld>
             <a:endParaRPr lang="en-US"/>
           </a:p>
@@ -2518,7 +2518,7 @@
           <a:p>
             <a:fld id="{B65C9255-9F07-4181-9AD2-897FFC0A3B7E}" type="datetimeFigureOut">
               <a:rPr lang="en-US" smtClean="0"/>
-              <a:t>11/30/18</a:t>
+              <a:t>12/1/18</a:t>
             </a:fld>
             <a:endParaRPr lang="en-US"/>
           </a:p>
@@ -2741,7 +2741,7 @@
           <a:p>
             <a:fld id="{B65C9255-9F07-4181-9AD2-897FFC0A3B7E}" type="datetimeFigureOut">
               <a:rPr lang="en-US" smtClean="0"/>
-              <a:t>11/30/18</a:t>
+              <a:t>12/1/18</a:t>
             </a:fld>
             <a:endParaRPr lang="en-US"/>
           </a:p>

</xml_diff>